<commit_message>
Adding presentation and documentations
</commit_message>
<xml_diff>
--- a/Course_Spring_5_Project_Presentation.pptx
+++ b/Course_Spring_5_Project_Presentation.pptx
@@ -4303,19 +4303,7 @@
                 </a:solidFill>
                 <a:latin typeface="Monotype Corsiva" pitchFamily="66" charset="0"/>
               </a:rPr>
-              <a:t>Разработка </a:t>
-            </a:r>
-            <a:r>
-              <a:rPr lang="ru-RU" sz="2400" b="1" dirty="0" smtClean="0">
-                <a:solidFill>
-                  <a:schemeClr val="accent1">
-                    <a:lumMod val="40000"/>
-                    <a:lumOff val="60000"/>
-                  </a:schemeClr>
-                </a:solidFill>
-                <a:latin typeface="Monotype Corsiva" pitchFamily="66" charset="0"/>
-              </a:rPr>
-              <a:t>на </a:t>
+              <a:t>Разработка на </a:t>
             </a:r>
             <a:r>
               <a:rPr lang="ru-RU" sz="2400" b="1" dirty="0" err="1" smtClean="0">
@@ -4673,90 +4661,6 @@
       </p:grpSpPr>
       <p:sp>
         <p:nvSpPr>
-          <p:cNvPr id="3" name="Контейнер за съдържание 2"/>
-          <p:cNvSpPr>
-            <a:spLocks noGrp="1"/>
-          </p:cNvSpPr>
-          <p:nvPr>
-            <p:ph sz="half" idx="1"/>
-          </p:nvPr>
-        </p:nvSpPr>
-        <p:spPr/>
-        <p:txBody>
-          <a:bodyPr/>
-          <a:lstStyle/>
-          <a:p>
-            <a:pPr algn="ctr">
-              <a:buNone/>
-            </a:pPr>
-            <a:r>
-              <a:rPr lang="en-US" dirty="0" smtClean="0">
-                <a:solidFill>
-                  <a:schemeClr val="accent1">
-                    <a:lumMod val="40000"/>
-                    <a:lumOff val="60000"/>
-                  </a:schemeClr>
-                </a:solidFill>
-                <a:latin typeface="Monotype Corsiva" pitchFamily="66" charset="0"/>
-              </a:rPr>
-              <a:t>Screenshot 1</a:t>
-            </a:r>
-            <a:endParaRPr lang="bg-BG" dirty="0">
-              <a:solidFill>
-                <a:schemeClr val="accent1">
-                  <a:lumMod val="40000"/>
-                  <a:lumOff val="60000"/>
-                </a:schemeClr>
-              </a:solidFill>
-              <a:latin typeface="Monotype Corsiva" pitchFamily="66" charset="0"/>
-            </a:endParaRPr>
-          </a:p>
-        </p:txBody>
-      </p:sp>
-      <p:sp>
-        <p:nvSpPr>
-          <p:cNvPr id="4" name="Контейнер за съдържание 3"/>
-          <p:cNvSpPr>
-            <a:spLocks noGrp="1"/>
-          </p:cNvSpPr>
-          <p:nvPr>
-            <p:ph sz="half" idx="2"/>
-          </p:nvPr>
-        </p:nvSpPr>
-        <p:spPr/>
-        <p:txBody>
-          <a:bodyPr/>
-          <a:lstStyle/>
-          <a:p>
-            <a:pPr>
-              <a:buNone/>
-            </a:pPr>
-            <a:r>
-              <a:rPr lang="en-US" dirty="0" smtClean="0">
-                <a:solidFill>
-                  <a:schemeClr val="accent1">
-                    <a:lumMod val="40000"/>
-                    <a:lumOff val="60000"/>
-                  </a:schemeClr>
-                </a:solidFill>
-                <a:latin typeface="Monotype Corsiva" pitchFamily="66" charset="0"/>
-              </a:rPr>
-              <a:t>Screenshot 2 (maybe)</a:t>
-            </a:r>
-            <a:endParaRPr lang="bg-BG" dirty="0" smtClean="0">
-              <a:solidFill>
-                <a:schemeClr val="accent1">
-                  <a:lumMod val="40000"/>
-                  <a:lumOff val="60000"/>
-                </a:schemeClr>
-              </a:solidFill>
-              <a:latin typeface="Monotype Corsiva" pitchFamily="66" charset="0"/>
-            </a:endParaRPr>
-          </a:p>
-        </p:txBody>
-      </p:sp>
-      <p:sp>
-        <p:nvSpPr>
           <p:cNvPr id="5" name="Текстово поле 4"/>
           <p:cNvSpPr txBox="1"/>
           <p:nvPr/>
@@ -4802,6 +4706,38 @@
           </a:p>
         </p:txBody>
       </p:sp>
+      <p:pic>
+        <p:nvPicPr>
+          <p:cNvPr id="1026" name="Picture 2"/>
+          <p:cNvPicPr>
+            <a:picLocks noChangeAspect="1" noChangeArrowheads="1"/>
+          </p:cNvPicPr>
+          <p:nvPr/>
+        </p:nvPicPr>
+        <p:blipFill>
+          <a:blip r:embed="rId2" cstate="print"/>
+          <a:srcRect/>
+          <a:stretch>
+            <a:fillRect/>
+          </a:stretch>
+        </p:blipFill>
+        <p:spPr bwMode="auto">
+          <a:xfrm>
+            <a:off x="1187624" y="1484784"/>
+            <a:ext cx="7812360" cy="4013915"/>
+          </a:xfrm>
+          <a:prstGeom prst="rect">
+            <a:avLst/>
+          </a:prstGeom>
+          <a:noFill/>
+          <a:ln w="9525">
+            <a:noFill/>
+            <a:miter lim="800000"/>
+            <a:headEnd/>
+            <a:tailEnd/>
+          </a:ln>
+        </p:spPr>
+      </p:pic>
     </p:spTree>
   </p:cSld>
   <p:clrMapOvr>

</xml_diff>